<commit_message>
Added lit survey docs and updated report
</commit_message>
<xml_diff>
--- a/review 1.pptx
+++ b/review 1.pptx
@@ -9,7 +9,9 @@
     <p:sldId id="257" r:id="rId3"/>
     <p:sldId id="258" r:id="rId4"/>
     <p:sldId id="259" r:id="rId5"/>
-    <p:sldId id="260" r:id="rId6"/>
+    <p:sldId id="261" r:id="rId6"/>
+    <p:sldId id="262" r:id="rId7"/>
+    <p:sldId id="260" r:id="rId8"/>
   </p:sldIdLst>
   <p:sldSz cx="9144000" cy="6858000" type="screen4x3"/>
   <p:notesSz cx="6858000" cy="9144000"/>
@@ -447,7 +449,7 @@
             <a:fld id="{1D8BD707-D9CF-40AE-B4C6-C98DA3205C09}" type="datetimeFigureOut">
               <a:rPr lang="en-US" smtClean="0"/>
               <a:pPr/>
-              <a:t>1/10/2020</a:t>
+              <a:t>1/15/2020</a:t>
             </a:fld>
             <a:endParaRPr lang="en-US"/>
           </a:p>
@@ -1532,7 +1534,7 @@
             <a:fld id="{1D8BD707-D9CF-40AE-B4C6-C98DA3205C09}" type="datetimeFigureOut">
               <a:rPr lang="en-US" smtClean="0"/>
               <a:pPr/>
-              <a:t>1/10/2020</a:t>
+              <a:t>1/15/2020</a:t>
             </a:fld>
             <a:endParaRPr lang="en-US"/>
           </a:p>
@@ -2509,7 +2511,7 @@
             <a:fld id="{1D8BD707-D9CF-40AE-B4C6-C98DA3205C09}" type="datetimeFigureOut">
               <a:rPr lang="en-US" smtClean="0"/>
               <a:pPr/>
-              <a:t>1/10/2020</a:t>
+              <a:t>1/15/2020</a:t>
             </a:fld>
             <a:endParaRPr lang="en-US"/>
           </a:p>
@@ -3640,7 +3642,7 @@
             <a:fld id="{1D8BD707-D9CF-40AE-B4C6-C98DA3205C09}" type="datetimeFigureOut">
               <a:rPr lang="en-US" smtClean="0"/>
               <a:pPr/>
-              <a:t>1/10/2020</a:t>
+              <a:t>1/15/2020</a:t>
             </a:fld>
             <a:endParaRPr lang="en-US"/>
           </a:p>
@@ -4670,7 +4672,7 @@
             <a:fld id="{1D8BD707-D9CF-40AE-B4C6-C98DA3205C09}" type="datetimeFigureOut">
               <a:rPr lang="en-US" smtClean="0"/>
               <a:pPr/>
-              <a:t>1/10/2020</a:t>
+              <a:t>1/15/2020</a:t>
             </a:fld>
             <a:endParaRPr lang="en-US"/>
           </a:p>
@@ -5327,7 +5329,7 @@
             <a:fld id="{1D8BD707-D9CF-40AE-B4C6-C98DA3205C09}" type="datetimeFigureOut">
               <a:rPr lang="en-US" smtClean="0"/>
               <a:pPr/>
-              <a:t>1/10/2020</a:t>
+              <a:t>1/15/2020</a:t>
             </a:fld>
             <a:endParaRPr lang="en-US"/>
           </a:p>
@@ -6185,7 +6187,7 @@
             <a:fld id="{1D8BD707-D9CF-40AE-B4C6-C98DA3205C09}" type="datetimeFigureOut">
               <a:rPr lang="en-US" smtClean="0"/>
               <a:pPr/>
-              <a:t>1/10/2020</a:t>
+              <a:t>1/15/2020</a:t>
             </a:fld>
             <a:endParaRPr lang="en-US"/>
           </a:p>
@@ -6372,7 +6374,7 @@
             <a:fld id="{1D8BD707-D9CF-40AE-B4C6-C98DA3205C09}" type="datetimeFigureOut">
               <a:rPr lang="en-US" smtClean="0"/>
               <a:pPr/>
-              <a:t>1/10/2020</a:t>
+              <a:t>1/15/2020</a:t>
             </a:fld>
             <a:endParaRPr lang="en-US"/>
           </a:p>
@@ -7341,7 +7343,7 @@
             <a:fld id="{1D8BD707-D9CF-40AE-B4C6-C98DA3205C09}" type="datetimeFigureOut">
               <a:rPr lang="en-US" smtClean="0"/>
               <a:pPr/>
-              <a:t>1/10/2020</a:t>
+              <a:t>1/15/2020</a:t>
             </a:fld>
             <a:endParaRPr lang="en-US"/>
           </a:p>
@@ -7549,7 +7551,7 @@
             <a:fld id="{1D8BD707-D9CF-40AE-B4C6-C98DA3205C09}" type="datetimeFigureOut">
               <a:rPr lang="en-US" smtClean="0"/>
               <a:pPr/>
-              <a:t>1/10/2020</a:t>
+              <a:t>1/15/2020</a:t>
             </a:fld>
             <a:endParaRPr lang="en-US"/>
           </a:p>
@@ -8580,7 +8582,7 @@
             <a:fld id="{1D8BD707-D9CF-40AE-B4C6-C98DA3205C09}" type="datetimeFigureOut">
               <a:rPr lang="en-US" smtClean="0"/>
               <a:pPr/>
-              <a:t>1/10/2020</a:t>
+              <a:t>1/15/2020</a:t>
             </a:fld>
             <a:endParaRPr lang="en-US"/>
           </a:p>
@@ -8849,7 +8851,7 @@
             <a:fld id="{1D8BD707-D9CF-40AE-B4C6-C98DA3205C09}" type="datetimeFigureOut">
               <a:rPr lang="en-US" smtClean="0"/>
               <a:pPr/>
-              <a:t>1/10/2020</a:t>
+              <a:t>1/15/2020</a:t>
             </a:fld>
             <a:endParaRPr lang="en-US"/>
           </a:p>
@@ -9256,7 +9258,7 @@
             <a:fld id="{1D8BD707-D9CF-40AE-B4C6-C98DA3205C09}" type="datetimeFigureOut">
               <a:rPr lang="en-US" smtClean="0"/>
               <a:pPr/>
-              <a:t>1/10/2020</a:t>
+              <a:t>1/15/2020</a:t>
             </a:fld>
             <a:endParaRPr lang="en-US"/>
           </a:p>
@@ -9380,7 +9382,7 @@
             <a:fld id="{1D8BD707-D9CF-40AE-B4C6-C98DA3205C09}" type="datetimeFigureOut">
               <a:rPr lang="en-US" smtClean="0"/>
               <a:pPr/>
-              <a:t>1/10/2020</a:t>
+              <a:t>1/15/2020</a:t>
             </a:fld>
             <a:endParaRPr lang="en-US"/>
           </a:p>
@@ -9472,7 +9474,7 @@
             <a:fld id="{1D8BD707-D9CF-40AE-B4C6-C98DA3205C09}" type="datetimeFigureOut">
               <a:rPr lang="en-US" smtClean="0"/>
               <a:pPr/>
-              <a:t>1/10/2020</a:t>
+              <a:t>1/15/2020</a:t>
             </a:fld>
             <a:endParaRPr lang="en-US"/>
           </a:p>
@@ -10550,7 +10552,7 @@
             <a:fld id="{1D8BD707-D9CF-40AE-B4C6-C98DA3205C09}" type="datetimeFigureOut">
               <a:rPr lang="en-US" smtClean="0"/>
               <a:pPr/>
-              <a:t>1/10/2020</a:t>
+              <a:t>1/15/2020</a:t>
             </a:fld>
             <a:endParaRPr lang="en-US"/>
           </a:p>
@@ -11655,7 +11657,7 @@
             <a:fld id="{1D8BD707-D9CF-40AE-B4C6-C98DA3205C09}" type="datetimeFigureOut">
               <a:rPr lang="en-US" smtClean="0"/>
               <a:pPr/>
-              <a:t>1/10/2020</a:t>
+              <a:t>1/15/2020</a:t>
             </a:fld>
             <a:endParaRPr lang="en-US"/>
           </a:p>
@@ -12649,7 +12651,7 @@
             <a:fld id="{1D8BD707-D9CF-40AE-B4C6-C98DA3205C09}" type="datetimeFigureOut">
               <a:rPr lang="en-US" smtClean="0"/>
               <a:pPr/>
-              <a:t>1/10/2020</a:t>
+              <a:t>1/15/2020</a:t>
             </a:fld>
             <a:endParaRPr lang="en-US"/>
           </a:p>
@@ -13620,7 +13622,7 @@
           <a:p>
             <a:r>
               <a:rPr lang="en-US" dirty="0" smtClean="0"/>
-              <a:t>The Flowchart</a:t>
+              <a:t>Modules :</a:t>
             </a:r>
             <a:endParaRPr lang="en-US" dirty="0"/>
           </a:p>
@@ -13654,6 +13656,13 @@
   <p:clrMapOvr>
     <a:masterClrMapping/>
   </p:clrMapOvr>
+  <p:timing>
+    <p:tnLst>
+      <p:par>
+        <p:cTn id="1" dur="indefinite" restart="never" nodeType="tmRoot"/>
+      </p:par>
+    </p:tnLst>
+  </p:timing>
 </p:sld>
 </file>
 
@@ -13691,7 +13700,156 @@
           <a:p>
             <a:r>
               <a:rPr lang="en-US" dirty="0" smtClean="0"/>
-              <a:t>The Link</a:t>
+              <a:t>Detailed workflow</a:t>
+            </a:r>
+            <a:endParaRPr lang="en-US" dirty="0"/>
+          </a:p>
+        </p:txBody>
+      </p:sp>
+      <p:pic>
+        <p:nvPicPr>
+          <p:cNvPr id="4" name="Content Placeholder 3" descr="WordZone-full.jpg"/>
+          <p:cNvPicPr>
+            <a:picLocks noGrp="1" noChangeAspect="1"/>
+          </p:cNvPicPr>
+          <p:nvPr>
+            <p:ph idx="1"/>
+          </p:nvPr>
+        </p:nvPicPr>
+        <p:blipFill>
+          <a:blip r:embed="rId2"/>
+          <a:stretch>
+            <a:fillRect/>
+          </a:stretch>
+        </p:blipFill>
+        <p:spPr>
+          <a:xfrm>
+            <a:off x="167505" y="2590800"/>
+            <a:ext cx="8900295" cy="3352800"/>
+          </a:xfrm>
+        </p:spPr>
+      </p:pic>
+    </p:spTree>
+  </p:cSld>
+  <p:clrMapOvr>
+    <a:masterClrMapping/>
+  </p:clrMapOvr>
+  <p:timing>
+    <p:tnLst>
+      <p:par>
+        <p:cTn id="1" dur="indefinite" restart="never" nodeType="tmRoot"/>
+      </p:par>
+    </p:tnLst>
+  </p:timing>
+</p:sld>
+</file>
+
+<file path=ppt/slides/slide6.xml><?xml version="1.0" encoding="utf-8"?>
+<p:sld xmlns:a="http://schemas.openxmlformats.org/drawingml/2006/main" xmlns:r="http://schemas.openxmlformats.org/officeDocument/2006/relationships" xmlns:p="http://schemas.openxmlformats.org/presentationml/2006/main">
+  <p:cSld>
+    <p:spTree>
+      <p:nvGrpSpPr>
+        <p:cNvPr id="1" name=""/>
+        <p:cNvGrpSpPr/>
+        <p:nvPr/>
+      </p:nvGrpSpPr>
+      <p:grpSpPr>
+        <a:xfrm>
+          <a:off x="0" y="0"/>
+          <a:ext cx="0" cy="0"/>
+          <a:chOff x="0" y="0"/>
+          <a:chExt cx="0" cy="0"/>
+        </a:xfrm>
+      </p:grpSpPr>
+      <p:sp>
+        <p:nvSpPr>
+          <p:cNvPr id="2" name="Title 1"/>
+          <p:cNvSpPr>
+            <a:spLocks noGrp="1"/>
+          </p:cNvSpPr>
+          <p:nvPr>
+            <p:ph type="title"/>
+          </p:nvPr>
+        </p:nvSpPr>
+        <p:spPr/>
+        <p:txBody>
+          <a:bodyPr/>
+          <a:lstStyle/>
+          <a:p>
+            <a:r>
+              <a:rPr lang="en-US" dirty="0" smtClean="0"/>
+              <a:t>System Architecture:</a:t>
+            </a:r>
+            <a:endParaRPr lang="en-US" dirty="0"/>
+          </a:p>
+        </p:txBody>
+      </p:sp>
+      <p:pic>
+        <p:nvPicPr>
+          <p:cNvPr id="4" name="Content Placeholder 3" descr="SystemArchitecture.jpg"/>
+          <p:cNvPicPr>
+            <a:picLocks noGrp="1" noChangeAspect="1"/>
+          </p:cNvPicPr>
+          <p:nvPr>
+            <p:ph idx="1"/>
+          </p:nvPr>
+        </p:nvPicPr>
+        <p:blipFill>
+          <a:blip r:embed="rId2"/>
+          <a:stretch>
+            <a:fillRect/>
+          </a:stretch>
+        </p:blipFill>
+        <p:spPr>
+          <a:xfrm>
+            <a:off x="381000" y="2438400"/>
+            <a:ext cx="8570808" cy="3365500"/>
+          </a:xfrm>
+        </p:spPr>
+      </p:pic>
+    </p:spTree>
+  </p:cSld>
+  <p:clrMapOvr>
+    <a:masterClrMapping/>
+  </p:clrMapOvr>
+</p:sld>
+</file>
+
+<file path=ppt/slides/slide7.xml><?xml version="1.0" encoding="utf-8"?>
+<p:sld xmlns:a="http://schemas.openxmlformats.org/drawingml/2006/main" xmlns:r="http://schemas.openxmlformats.org/officeDocument/2006/relationships" xmlns:p="http://schemas.openxmlformats.org/presentationml/2006/main">
+  <p:cSld>
+    <p:spTree>
+      <p:nvGrpSpPr>
+        <p:cNvPr id="1" name=""/>
+        <p:cNvGrpSpPr/>
+        <p:nvPr/>
+      </p:nvGrpSpPr>
+      <p:grpSpPr>
+        <a:xfrm>
+          <a:off x="0" y="0"/>
+          <a:ext cx="0" cy="0"/>
+          <a:chOff x="0" y="0"/>
+          <a:chExt cx="0" cy="0"/>
+        </a:xfrm>
+      </p:grpSpPr>
+      <p:sp>
+        <p:nvSpPr>
+          <p:cNvPr id="2" name="Title 1"/>
+          <p:cNvSpPr>
+            <a:spLocks noGrp="1"/>
+          </p:cNvSpPr>
+          <p:nvPr>
+            <p:ph type="title"/>
+          </p:nvPr>
+        </p:nvSpPr>
+        <p:spPr/>
+        <p:txBody>
+          <a:bodyPr/>
+          <a:lstStyle/>
+          <a:p>
+            <a:r>
+              <a:rPr lang="en-US" dirty="0" smtClean="0"/>
+              <a:t>The Link for wireframe</a:t>
             </a:r>
             <a:endParaRPr lang="en-US" dirty="0"/>
           </a:p>
@@ -13716,13 +13874,7 @@
               <a:rPr lang="en-US" dirty="0" smtClean="0">
                 <a:hlinkClick r:id="rId2"/>
               </a:rPr>
-              <a:t>https://xd.adobe.com/view/d214429e-8809-458a-6d4b-6627d385a3fe-a425</a:t>
-            </a:r>
-            <a:r>
-              <a:rPr lang="en-US" dirty="0" smtClean="0">
-                <a:hlinkClick r:id="rId2"/>
-              </a:rPr>
-              <a:t>/</a:t>
+              <a:t>https://xd.adobe.com/view/d214429e-8809-458a-6d4b-6627d385a3fe-a425/</a:t>
             </a:r>
             <a:r>
               <a:rPr lang="en-US" dirty="0" smtClean="0"/>

</xml_diff>

<commit_message>
Added Spell checker. updated ppt. Hyper screen's formatting is pending
</commit_message>
<xml_diff>
--- a/review 1.pptx
+++ b/review 1.pptx
@@ -13,6 +13,11 @@
     <p:sldId id="263" r:id="rId7"/>
     <p:sldId id="262" r:id="rId8"/>
     <p:sldId id="260" r:id="rId9"/>
+    <p:sldId id="264" r:id="rId10"/>
+    <p:sldId id="265" r:id="rId11"/>
+    <p:sldId id="266" r:id="rId12"/>
+    <p:sldId id="267" r:id="rId13"/>
+    <p:sldId id="268" r:id="rId14"/>
   </p:sldIdLst>
   <p:sldSz cx="9144000" cy="6858000" type="screen4x3"/>
   <p:notesSz cx="6858000" cy="9144000"/>
@@ -113,7 +118,7 @@
   </p:defaultTextStyle>
   <p:extLst>
     <p:ext uri="{EFAFB233-063F-42B5-8137-9DF3F51BA10A}">
-      <p15:sldGuideLst xmlns:p15="http://schemas.microsoft.com/office/powerpoint/2012/main">
+      <p15:sldGuideLst xmlns:p15="http://schemas.microsoft.com/office/powerpoint/2012/main" xmlns="">
         <p15:guide id="1" orient="horz" pos="2160">
           <p15:clr>
             <a:srgbClr val="A4A3A4"/>
@@ -466,7 +471,7 @@
             <a:fld id="{1D8BD707-D9CF-40AE-B4C6-C98DA3205C09}" type="datetimeFigureOut">
               <a:rPr lang="en-US" smtClean="0"/>
               <a:pPr/>
-              <a:t>1/20/2020</a:t>
+              <a:t>2/14/2020</a:t>
             </a:fld>
             <a:endParaRPr lang="en-US"/>
           </a:p>
@@ -1551,7 +1556,7 @@
             <a:fld id="{1D8BD707-D9CF-40AE-B4C6-C98DA3205C09}" type="datetimeFigureOut">
               <a:rPr lang="en-US" smtClean="0"/>
               <a:pPr/>
-              <a:t>1/20/2020</a:t>
+              <a:t>2/14/2020</a:t>
             </a:fld>
             <a:endParaRPr lang="en-US"/>
           </a:p>
@@ -2528,7 +2533,7 @@
             <a:fld id="{1D8BD707-D9CF-40AE-B4C6-C98DA3205C09}" type="datetimeFigureOut">
               <a:rPr lang="en-US" smtClean="0"/>
               <a:pPr/>
-              <a:t>1/20/2020</a:t>
+              <a:t>2/14/2020</a:t>
             </a:fld>
             <a:endParaRPr lang="en-US"/>
           </a:p>
@@ -3659,7 +3664,7 @@
             <a:fld id="{1D8BD707-D9CF-40AE-B4C6-C98DA3205C09}" type="datetimeFigureOut">
               <a:rPr lang="en-US" smtClean="0"/>
               <a:pPr/>
-              <a:t>1/20/2020</a:t>
+              <a:t>2/14/2020</a:t>
             </a:fld>
             <a:endParaRPr lang="en-US"/>
           </a:p>
@@ -4689,7 +4694,7 @@
             <a:fld id="{1D8BD707-D9CF-40AE-B4C6-C98DA3205C09}" type="datetimeFigureOut">
               <a:rPr lang="en-US" smtClean="0"/>
               <a:pPr/>
-              <a:t>1/20/2020</a:t>
+              <a:t>2/14/2020</a:t>
             </a:fld>
             <a:endParaRPr lang="en-US"/>
           </a:p>
@@ -5346,7 +5351,7 @@
             <a:fld id="{1D8BD707-D9CF-40AE-B4C6-C98DA3205C09}" type="datetimeFigureOut">
               <a:rPr lang="en-US" smtClean="0"/>
               <a:pPr/>
-              <a:t>1/20/2020</a:t>
+              <a:t>2/14/2020</a:t>
             </a:fld>
             <a:endParaRPr lang="en-US"/>
           </a:p>
@@ -6204,7 +6209,7 @@
             <a:fld id="{1D8BD707-D9CF-40AE-B4C6-C98DA3205C09}" type="datetimeFigureOut">
               <a:rPr lang="en-US" smtClean="0"/>
               <a:pPr/>
-              <a:t>1/20/2020</a:t>
+              <a:t>2/14/2020</a:t>
             </a:fld>
             <a:endParaRPr lang="en-US"/>
           </a:p>
@@ -6391,7 +6396,7 @@
             <a:fld id="{1D8BD707-D9CF-40AE-B4C6-C98DA3205C09}" type="datetimeFigureOut">
               <a:rPr lang="en-US" smtClean="0"/>
               <a:pPr/>
-              <a:t>1/20/2020</a:t>
+              <a:t>2/14/2020</a:t>
             </a:fld>
             <a:endParaRPr lang="en-US"/>
           </a:p>
@@ -7360,7 +7365,7 @@
             <a:fld id="{1D8BD707-D9CF-40AE-B4C6-C98DA3205C09}" type="datetimeFigureOut">
               <a:rPr lang="en-US" smtClean="0"/>
               <a:pPr/>
-              <a:t>1/20/2020</a:t>
+              <a:t>2/14/2020</a:t>
             </a:fld>
             <a:endParaRPr lang="en-US"/>
           </a:p>
@@ -7568,7 +7573,7 @@
             <a:fld id="{1D8BD707-D9CF-40AE-B4C6-C98DA3205C09}" type="datetimeFigureOut">
               <a:rPr lang="en-US" smtClean="0"/>
               <a:pPr/>
-              <a:t>1/20/2020</a:t>
+              <a:t>2/14/2020</a:t>
             </a:fld>
             <a:endParaRPr lang="en-US"/>
           </a:p>
@@ -8599,7 +8604,7 @@
             <a:fld id="{1D8BD707-D9CF-40AE-B4C6-C98DA3205C09}" type="datetimeFigureOut">
               <a:rPr lang="en-US" smtClean="0"/>
               <a:pPr/>
-              <a:t>1/20/2020</a:t>
+              <a:t>2/14/2020</a:t>
             </a:fld>
             <a:endParaRPr lang="en-US"/>
           </a:p>
@@ -8868,7 +8873,7 @@
             <a:fld id="{1D8BD707-D9CF-40AE-B4C6-C98DA3205C09}" type="datetimeFigureOut">
               <a:rPr lang="en-US" smtClean="0"/>
               <a:pPr/>
-              <a:t>1/20/2020</a:t>
+              <a:t>2/14/2020</a:t>
             </a:fld>
             <a:endParaRPr lang="en-US"/>
           </a:p>
@@ -9275,7 +9280,7 @@
             <a:fld id="{1D8BD707-D9CF-40AE-B4C6-C98DA3205C09}" type="datetimeFigureOut">
               <a:rPr lang="en-US" smtClean="0"/>
               <a:pPr/>
-              <a:t>1/20/2020</a:t>
+              <a:t>2/14/2020</a:t>
             </a:fld>
             <a:endParaRPr lang="en-US"/>
           </a:p>
@@ -9399,7 +9404,7 @@
             <a:fld id="{1D8BD707-D9CF-40AE-B4C6-C98DA3205C09}" type="datetimeFigureOut">
               <a:rPr lang="en-US" smtClean="0"/>
               <a:pPr/>
-              <a:t>1/20/2020</a:t>
+              <a:t>2/14/2020</a:t>
             </a:fld>
             <a:endParaRPr lang="en-US"/>
           </a:p>
@@ -9491,7 +9496,7 @@
             <a:fld id="{1D8BD707-D9CF-40AE-B4C6-C98DA3205C09}" type="datetimeFigureOut">
               <a:rPr lang="en-US" smtClean="0"/>
               <a:pPr/>
-              <a:t>1/20/2020</a:t>
+              <a:t>2/14/2020</a:t>
             </a:fld>
             <a:endParaRPr lang="en-US"/>
           </a:p>
@@ -10569,7 +10574,7 @@
             <a:fld id="{1D8BD707-D9CF-40AE-B4C6-C98DA3205C09}" type="datetimeFigureOut">
               <a:rPr lang="en-US" smtClean="0"/>
               <a:pPr/>
-              <a:t>1/20/2020</a:t>
+              <a:t>2/14/2020</a:t>
             </a:fld>
             <a:endParaRPr lang="en-US"/>
           </a:p>
@@ -11674,7 +11679,7 @@
             <a:fld id="{1D8BD707-D9CF-40AE-B4C6-C98DA3205C09}" type="datetimeFigureOut">
               <a:rPr lang="en-US" smtClean="0"/>
               <a:pPr/>
-              <a:t>1/20/2020</a:t>
+              <a:t>2/14/2020</a:t>
             </a:fld>
             <a:endParaRPr lang="en-US"/>
           </a:p>
@@ -12668,7 +12673,7 @@
             <a:fld id="{1D8BD707-D9CF-40AE-B4C6-C98DA3205C09}" type="datetimeFigureOut">
               <a:rPr lang="en-US" smtClean="0"/>
               <a:pPr/>
-              <a:t>1/20/2020</a:t>
+              <a:t>2/14/2020</a:t>
             </a:fld>
             <a:endParaRPr lang="en-US"/>
           </a:p>
@@ -13377,6 +13382,340 @@
 </p:sld>
 </file>
 
+<file path=ppt/slides/slide10.xml><?xml version="1.0" encoding="utf-8"?>
+<p:sld xmlns:a="http://schemas.openxmlformats.org/drawingml/2006/main" xmlns:r="http://schemas.openxmlformats.org/officeDocument/2006/relationships" xmlns:p="http://schemas.openxmlformats.org/presentationml/2006/main">
+  <p:cSld>
+    <p:spTree>
+      <p:nvGrpSpPr>
+        <p:cNvPr id="1" name=""/>
+        <p:cNvGrpSpPr/>
+        <p:nvPr/>
+      </p:nvGrpSpPr>
+      <p:grpSpPr>
+        <a:xfrm>
+          <a:off x="0" y="0"/>
+          <a:ext cx="0" cy="0"/>
+          <a:chOff x="0" y="0"/>
+          <a:chExt cx="0" cy="0"/>
+        </a:xfrm>
+      </p:grpSpPr>
+      <p:sp>
+        <p:nvSpPr>
+          <p:cNvPr id="2" name="Title 1"/>
+          <p:cNvSpPr>
+            <a:spLocks noGrp="1"/>
+          </p:cNvSpPr>
+          <p:nvPr>
+            <p:ph type="title"/>
+          </p:nvPr>
+        </p:nvSpPr>
+        <p:spPr/>
+        <p:txBody>
+          <a:bodyPr/>
+          <a:lstStyle/>
+          <a:p>
+            <a:r>
+              <a:rPr lang="en-US" dirty="0" smtClean="0"/>
+              <a:t>Crossword Helper</a:t>
+            </a:r>
+            <a:endParaRPr lang="en-US" dirty="0"/>
+          </a:p>
+        </p:txBody>
+      </p:sp>
+      <p:sp>
+        <p:nvSpPr>
+          <p:cNvPr id="3" name="Content Placeholder 2"/>
+          <p:cNvSpPr>
+            <a:spLocks noGrp="1"/>
+          </p:cNvSpPr>
+          <p:nvPr>
+            <p:ph idx="1"/>
+          </p:nvPr>
+        </p:nvSpPr>
+        <p:spPr/>
+        <p:txBody>
+          <a:bodyPr/>
+          <a:lstStyle/>
+          <a:p>
+            <a:r>
+              <a:rPr lang="en-US" dirty="0" smtClean="0"/>
+              <a:t>User can enter a word nearest to their description</a:t>
+            </a:r>
+          </a:p>
+          <a:p>
+            <a:r>
+              <a:rPr lang="en-US" dirty="0" smtClean="0"/>
+              <a:t>And the length of the word</a:t>
+            </a:r>
+          </a:p>
+          <a:p>
+            <a:endParaRPr lang="en-US" dirty="0" smtClean="0"/>
+          </a:p>
+          <a:p>
+            <a:r>
+              <a:rPr lang="en-US" dirty="0" smtClean="0"/>
+              <a:t>The user receives a list of words, which they can narrow down by defining a particular character and its position.</a:t>
+            </a:r>
+            <a:endParaRPr lang="en-US" dirty="0"/>
+          </a:p>
+        </p:txBody>
+      </p:sp>
+    </p:spTree>
+  </p:cSld>
+  <p:clrMapOvr>
+    <a:masterClrMapping/>
+  </p:clrMapOvr>
+</p:sld>
+</file>
+
+<file path=ppt/slides/slide11.xml><?xml version="1.0" encoding="utf-8"?>
+<p:sld xmlns:a="http://schemas.openxmlformats.org/drawingml/2006/main" xmlns:r="http://schemas.openxmlformats.org/officeDocument/2006/relationships" xmlns:p="http://schemas.openxmlformats.org/presentationml/2006/main">
+  <p:cSld>
+    <p:spTree>
+      <p:nvGrpSpPr>
+        <p:cNvPr id="1" name=""/>
+        <p:cNvGrpSpPr/>
+        <p:nvPr/>
+      </p:nvGrpSpPr>
+      <p:grpSpPr>
+        <a:xfrm>
+          <a:off x="0" y="0"/>
+          <a:ext cx="0" cy="0"/>
+          <a:chOff x="0" y="0"/>
+          <a:chExt cx="0" cy="0"/>
+        </a:xfrm>
+      </p:grpSpPr>
+      <p:sp>
+        <p:nvSpPr>
+          <p:cNvPr id="2" name="Title 1"/>
+          <p:cNvSpPr>
+            <a:spLocks noGrp="1"/>
+          </p:cNvSpPr>
+          <p:nvPr>
+            <p:ph type="title"/>
+          </p:nvPr>
+        </p:nvSpPr>
+        <p:spPr/>
+        <p:txBody>
+          <a:bodyPr/>
+          <a:lstStyle/>
+          <a:p>
+            <a:r>
+              <a:rPr lang="en-US" dirty="0" smtClean="0"/>
+              <a:t>Scrabble Helper</a:t>
+            </a:r>
+            <a:endParaRPr lang="en-US" dirty="0"/>
+          </a:p>
+        </p:txBody>
+      </p:sp>
+      <p:sp>
+        <p:nvSpPr>
+          <p:cNvPr id="3" name="Content Placeholder 2"/>
+          <p:cNvSpPr>
+            <a:spLocks noGrp="1"/>
+          </p:cNvSpPr>
+          <p:nvPr>
+            <p:ph idx="1"/>
+          </p:nvPr>
+        </p:nvSpPr>
+        <p:spPr>
+          <a:xfrm>
+            <a:off x="990600" y="2971800"/>
+            <a:ext cx="6619244" cy="3416300"/>
+          </a:xfrm>
+        </p:spPr>
+        <p:txBody>
+          <a:bodyPr/>
+          <a:lstStyle/>
+          <a:p>
+            <a:r>
+              <a:rPr lang="en-US" dirty="0" smtClean="0"/>
+              <a:t>User can enter a word fragment they need in their word</a:t>
+            </a:r>
+          </a:p>
+          <a:p>
+            <a:r>
+              <a:rPr lang="en-US" dirty="0" smtClean="0"/>
+              <a:t>They can also enter its position and length.</a:t>
+            </a:r>
+            <a:endParaRPr lang="en-US" dirty="0"/>
+          </a:p>
+        </p:txBody>
+      </p:sp>
+    </p:spTree>
+  </p:cSld>
+  <p:clrMapOvr>
+    <a:masterClrMapping/>
+  </p:clrMapOvr>
+</p:sld>
+</file>
+
+<file path=ppt/slides/slide12.xml><?xml version="1.0" encoding="utf-8"?>
+<p:sld xmlns:a="http://schemas.openxmlformats.org/drawingml/2006/main" xmlns:r="http://schemas.openxmlformats.org/officeDocument/2006/relationships" xmlns:p="http://schemas.openxmlformats.org/presentationml/2006/main">
+  <p:cSld>
+    <p:spTree>
+      <p:nvGrpSpPr>
+        <p:cNvPr id="1" name=""/>
+        <p:cNvGrpSpPr/>
+        <p:nvPr/>
+      </p:nvGrpSpPr>
+      <p:grpSpPr>
+        <a:xfrm>
+          <a:off x="0" y="0"/>
+          <a:ext cx="0" cy="0"/>
+          <a:chOff x="0" y="0"/>
+          <a:chExt cx="0" cy="0"/>
+        </a:xfrm>
+      </p:grpSpPr>
+      <p:sp>
+        <p:nvSpPr>
+          <p:cNvPr id="2" name="Title 1"/>
+          <p:cNvSpPr>
+            <a:spLocks noGrp="1"/>
+          </p:cNvSpPr>
+          <p:nvPr>
+            <p:ph type="title"/>
+          </p:nvPr>
+        </p:nvSpPr>
+        <p:spPr/>
+        <p:txBody>
+          <a:bodyPr/>
+          <a:lstStyle/>
+          <a:p>
+            <a:r>
+              <a:rPr lang="en-US" dirty="0" smtClean="0"/>
+              <a:t>Redefined Zones:</a:t>
+            </a:r>
+            <a:endParaRPr lang="en-US" dirty="0"/>
+          </a:p>
+        </p:txBody>
+      </p:sp>
+      <p:pic>
+        <p:nvPicPr>
+          <p:cNvPr id="1026" name="Picture 2"/>
+          <p:cNvPicPr>
+            <a:picLocks noGrp="1" noChangeAspect="1" noChangeArrowheads="1"/>
+          </p:cNvPicPr>
+          <p:nvPr>
+            <p:ph idx="1"/>
+          </p:nvPr>
+        </p:nvPicPr>
+        <p:blipFill>
+          <a:blip r:embed="rId2"/>
+          <a:srcRect/>
+          <a:stretch>
+            <a:fillRect/>
+          </a:stretch>
+        </p:blipFill>
+        <p:spPr bwMode="auto">
+          <a:xfrm>
+            <a:off x="457200" y="2438400"/>
+            <a:ext cx="8072015" cy="3581400"/>
+          </a:xfrm>
+          <a:prstGeom prst="rect">
+            <a:avLst/>
+          </a:prstGeom>
+          <a:noFill/>
+          <a:ln w="9525">
+            <a:noFill/>
+            <a:miter lim="800000"/>
+            <a:headEnd/>
+            <a:tailEnd/>
+          </a:ln>
+          <a:effectLst/>
+        </p:spPr>
+      </p:pic>
+    </p:spTree>
+  </p:cSld>
+  <p:clrMapOvr>
+    <a:masterClrMapping/>
+  </p:clrMapOvr>
+</p:sld>
+</file>
+
+<file path=ppt/slides/slide13.xml><?xml version="1.0" encoding="utf-8"?>
+<p:sld xmlns:a="http://schemas.openxmlformats.org/drawingml/2006/main" xmlns:r="http://schemas.openxmlformats.org/officeDocument/2006/relationships" xmlns:p="http://schemas.openxmlformats.org/presentationml/2006/main">
+  <p:cSld>
+    <p:spTree>
+      <p:nvGrpSpPr>
+        <p:cNvPr id="1" name=""/>
+        <p:cNvGrpSpPr/>
+        <p:nvPr/>
+      </p:nvGrpSpPr>
+      <p:grpSpPr>
+        <a:xfrm>
+          <a:off x="0" y="0"/>
+          <a:ext cx="0" cy="0"/>
+          <a:chOff x="0" y="0"/>
+          <a:chExt cx="0" cy="0"/>
+        </a:xfrm>
+      </p:grpSpPr>
+      <p:sp>
+        <p:nvSpPr>
+          <p:cNvPr id="2" name="Title 1"/>
+          <p:cNvSpPr>
+            <a:spLocks noGrp="1"/>
+          </p:cNvSpPr>
+          <p:nvPr>
+            <p:ph type="title"/>
+          </p:nvPr>
+        </p:nvSpPr>
+        <p:spPr/>
+        <p:txBody>
+          <a:bodyPr/>
+          <a:lstStyle/>
+          <a:p>
+            <a:r>
+              <a:rPr lang="en-US" dirty="0" smtClean="0"/>
+              <a:t>Spell Checker and suggestion for words</a:t>
+            </a:r>
+            <a:endParaRPr lang="en-US" dirty="0"/>
+          </a:p>
+        </p:txBody>
+      </p:sp>
+      <p:pic>
+        <p:nvPicPr>
+          <p:cNvPr id="2050" name="Picture 2"/>
+          <p:cNvPicPr>
+            <a:picLocks noGrp="1" noChangeAspect="1" noChangeArrowheads="1"/>
+          </p:cNvPicPr>
+          <p:nvPr>
+            <p:ph idx="1"/>
+          </p:nvPr>
+        </p:nvPicPr>
+        <p:blipFill>
+          <a:blip r:embed="rId2"/>
+          <a:srcRect/>
+          <a:stretch>
+            <a:fillRect/>
+          </a:stretch>
+        </p:blipFill>
+        <p:spPr bwMode="auto">
+          <a:xfrm>
+            <a:off x="1752600" y="2286000"/>
+            <a:ext cx="5334000" cy="4218305"/>
+          </a:xfrm>
+          <a:prstGeom prst="rect">
+            <a:avLst/>
+          </a:prstGeom>
+          <a:noFill/>
+          <a:ln w="9525">
+            <a:noFill/>
+            <a:miter lim="800000"/>
+            <a:headEnd/>
+            <a:tailEnd/>
+          </a:ln>
+          <a:effectLst/>
+        </p:spPr>
+      </p:pic>
+    </p:spTree>
+  </p:cSld>
+  <p:clrMapOvr>
+    <a:masterClrMapping/>
+  </p:clrMapOvr>
+</p:sld>
+</file>
+
 <file path=ppt/slides/slide2.xml><?xml version="1.0" encoding="utf-8"?>
 <p:sld xmlns:a="http://schemas.openxmlformats.org/drawingml/2006/main" xmlns:r="http://schemas.openxmlformats.org/officeDocument/2006/relationships" xmlns:p="http://schemas.openxmlformats.org/presentationml/2006/main">
   <p:cSld>
@@ -13449,11 +13788,7 @@
           <a:p>
             <a:r>
               <a:rPr lang="en-US" dirty="0" smtClean="0"/>
-              <a:t>It is a place where one can find, understand and know more words</a:t>
-            </a:r>
-            <a:r>
-              <a:rPr lang="en-US" dirty="0" smtClean="0"/>
-              <a:t>.</a:t>
+              <a:t>It is a place where one can find, understand and know more words.</a:t>
             </a:r>
           </a:p>
           <a:p>
@@ -13470,7 +13805,6 @@
               <a:rPr lang="en-US" dirty="0" smtClean="0"/>
               <a:t>The idea is to give user a playground where users can explore and improve their vocabulary</a:t>
             </a:r>
-            <a:endParaRPr lang="en-US" dirty="0" smtClean="0"/>
           </a:p>
           <a:p>
             <a:endParaRPr lang="en-US" dirty="0"/>
@@ -13870,8 +14204,13 @@
           <a:p>
             <a:r>
               <a:rPr lang="en-US" dirty="0" smtClean="0"/>
-              <a:t>NLTK – For NLP related operations like stemming, lemmatizing.</a:t>
+              <a:t>NLTK – For NLP related operations like stemming, </a:t>
             </a:r>
+            <a:r>
+              <a:rPr lang="en-US" dirty="0" smtClean="0"/>
+              <a:t>lemmatizing and for corpus.</a:t>
+            </a:r>
+            <a:endParaRPr lang="en-US" dirty="0" smtClean="0"/>
           </a:p>
           <a:p>
             <a:r>
@@ -13896,8 +14235,18 @@
             </a:r>
             <a:r>
               <a:rPr lang="en-US" dirty="0" smtClean="0"/>
-              <a:t> – Python GUI.</a:t>
+              <a:t> – Python GUI</a:t>
             </a:r>
+            <a:r>
+              <a:rPr lang="en-US" dirty="0" smtClean="0"/>
+              <a:t>.</a:t>
+            </a:r>
+          </a:p>
+          <a:p>
+            <a:pPr>
+              <a:buNone/>
+            </a:pPr>
+            <a:endParaRPr lang="en-US" dirty="0" smtClean="0"/>
           </a:p>
           <a:p>
             <a:endParaRPr lang="en-US" dirty="0"/>
@@ -13907,7 +14256,7 @@
     </p:spTree>
     <p:extLst>
       <p:ext uri="{BB962C8B-B14F-4D97-AF65-F5344CB8AC3E}">
-        <p14:creationId xmlns:p14="http://schemas.microsoft.com/office/powerpoint/2010/main" val="294594409"/>
+        <p14:creationId xmlns:p14="http://schemas.microsoft.com/office/powerpoint/2010/main" xmlns="" val="294594409"/>
       </p:ext>
     </p:extLst>
   </p:cSld>
@@ -14083,6 +14432,109 @@
       </p:par>
     </p:tnLst>
   </p:timing>
+</p:sld>
+</file>
+
+<file path=ppt/slides/slide9.xml><?xml version="1.0" encoding="utf-8"?>
+<p:sld xmlns:a="http://schemas.openxmlformats.org/drawingml/2006/main" xmlns:r="http://schemas.openxmlformats.org/officeDocument/2006/relationships" xmlns:p="http://schemas.openxmlformats.org/presentationml/2006/main">
+  <p:cSld>
+    <p:spTree>
+      <p:nvGrpSpPr>
+        <p:cNvPr id="1" name=""/>
+        <p:cNvGrpSpPr/>
+        <p:nvPr/>
+      </p:nvGrpSpPr>
+      <p:grpSpPr>
+        <a:xfrm>
+          <a:off x="0" y="0"/>
+          <a:ext cx="0" cy="0"/>
+          <a:chOff x="0" y="0"/>
+          <a:chExt cx="0" cy="0"/>
+        </a:xfrm>
+      </p:grpSpPr>
+      <p:sp>
+        <p:nvSpPr>
+          <p:cNvPr id="2" name="Title 1"/>
+          <p:cNvSpPr>
+            <a:spLocks noGrp="1"/>
+          </p:cNvSpPr>
+          <p:nvPr>
+            <p:ph type="title"/>
+          </p:nvPr>
+        </p:nvSpPr>
+        <p:spPr/>
+        <p:txBody>
+          <a:bodyPr/>
+          <a:lstStyle/>
+          <a:p>
+            <a:r>
+              <a:rPr lang="en-US" dirty="0" smtClean="0"/>
+              <a:t>Review 2 </a:t>
+            </a:r>
+            <a:endParaRPr lang="en-US" dirty="0"/>
+          </a:p>
+        </p:txBody>
+      </p:sp>
+      <p:sp>
+        <p:nvSpPr>
+          <p:cNvPr id="3" name="Content Placeholder 2"/>
+          <p:cNvSpPr>
+            <a:spLocks noGrp="1"/>
+          </p:cNvSpPr>
+          <p:nvPr>
+            <p:ph idx="1"/>
+          </p:nvPr>
+        </p:nvSpPr>
+        <p:spPr/>
+        <p:txBody>
+          <a:bodyPr/>
+          <a:lstStyle/>
+          <a:p>
+            <a:r>
+              <a:rPr lang="en-US" dirty="0" smtClean="0"/>
+              <a:t>Added Crossword Helper </a:t>
+            </a:r>
+          </a:p>
+          <a:p>
+            <a:r>
+              <a:rPr lang="en-US" dirty="0" smtClean="0"/>
+              <a:t>Added New section Scrabble helper</a:t>
+            </a:r>
+          </a:p>
+          <a:p>
+            <a:r>
+              <a:rPr lang="en-US" dirty="0" smtClean="0"/>
+              <a:t>Redefined the zones</a:t>
+            </a:r>
+          </a:p>
+          <a:p>
+            <a:r>
+              <a:rPr lang="en-US" dirty="0" smtClean="0"/>
+              <a:t>Added </a:t>
+            </a:r>
+            <a:r>
+              <a:rPr lang="en-US" dirty="0" err="1" smtClean="0"/>
+              <a:t>ScrollView</a:t>
+            </a:r>
+            <a:r>
+              <a:rPr lang="en-US" dirty="0" smtClean="0"/>
+              <a:t> in output</a:t>
+            </a:r>
+          </a:p>
+          <a:p>
+            <a:r>
+              <a:rPr lang="en-US" dirty="0" smtClean="0"/>
+              <a:t>Added Spell Checker and suggestions for other words.</a:t>
+            </a:r>
+            <a:endParaRPr lang="en-US" dirty="0"/>
+          </a:p>
+        </p:txBody>
+      </p:sp>
+    </p:spTree>
+  </p:cSld>
+  <p:clrMapOvr>
+    <a:masterClrMapping/>
+  </p:clrMapOvr>
 </p:sld>
 </file>
 
@@ -14344,7 +14796,7 @@
   <a:extraClrSchemeLst/>
   <a:extLst>
     <a:ext uri="{05A4C25C-085E-4340-85A3-A5531E510DB2}">
-      <thm15:themeFamily xmlns:thm15="http://schemas.microsoft.com/office/thememl/2012/main" name="Ion Boardroom" id="{FC33163D-4339-46B1-8EED-24C834239D99}" vid="{B8502691-933B-45FE-8764-BA278511EF27}"/>
+      <thm15:themeFamily xmlns:thm15="http://schemas.microsoft.com/office/thememl/2012/main" xmlns="" name="Ion Boardroom" id="{FC33163D-4339-46B1-8EED-24C834239D99}" vid="{B8502691-933B-45FE-8764-BA278511EF27}"/>
     </a:ext>
   </a:extLst>
 </a:theme>

</xml_diff>